<commit_message>
Report is 15% more awesome
</commit_message>
<xml_diff>
--- a/report.pptx
+++ b/report.pptx
@@ -3651,6 +3651,186 @@
           </a:xfrm>
         </p:spPr>
       </p:pic>
+      <p:pic>
+        <p:nvPicPr>
+          <p:cNvPr id="6" name="Graphic 5" descr="Badge 1 with solid fill">
+            <a:extLst>
+              <a:ext uri="{FF2B5EF4-FFF2-40B4-BE49-F238E27FC236}">
+                <a16:creationId xmlns:a16="http://schemas.microsoft.com/office/drawing/2014/main" id="{2B4671AD-B787-801E-0775-68839D8EECEE}"/>
+              </a:ext>
+            </a:extLst>
+          </p:cNvPr>
+          <p:cNvPicPr>
+            <a:picLocks noChangeAspect="1"/>
+          </p:cNvPicPr>
+          <p:nvPr/>
+        </p:nvPicPr>
+        <p:blipFill>
+          <a:blip r:embed="rId3">
+            <a:extLst>
+              <a:ext uri="{96DAC541-7B7A-43D3-8B79-37D633B846F1}">
+                <asvg:svgBlip xmlns:asvg="http://schemas.microsoft.com/office/drawing/2016/SVG/main" r:embed="rId4"/>
+              </a:ext>
+            </a:extLst>
+          </a:blip>
+          <a:stretch>
+            <a:fillRect/>
+          </a:stretch>
+        </p:blipFill>
+        <p:spPr>
+          <a:xfrm rot="20645870">
+            <a:off x="107775" y="1033639"/>
+            <a:ext cx="914400" cy="914400"/>
+          </a:xfrm>
+          <a:prstGeom prst="rect">
+            <a:avLst/>
+          </a:prstGeom>
+        </p:spPr>
+      </p:pic>
+      <p:pic>
+        <p:nvPicPr>
+          <p:cNvPr id="7" name="Graphic 6" descr="Badge with solid fill">
+            <a:extLst>
+              <a:ext uri="{FF2B5EF4-FFF2-40B4-BE49-F238E27FC236}">
+                <a16:creationId xmlns:a16="http://schemas.microsoft.com/office/drawing/2014/main" id="{33EDF388-2F04-FD86-F093-FC61D9A3E99A}"/>
+              </a:ext>
+            </a:extLst>
+          </p:cNvPr>
+          <p:cNvPicPr>
+            <a:picLocks noChangeAspect="1"/>
+          </p:cNvPicPr>
+          <p:nvPr/>
+        </p:nvPicPr>
+        <p:blipFill>
+          <a:blip r:embed="rId5">
+            <a:extLst>
+              <a:ext uri="{96DAC541-7B7A-43D3-8B79-37D633B846F1}">
+                <asvg:svgBlip xmlns:asvg="http://schemas.microsoft.com/office/drawing/2016/SVG/main" r:embed="rId6"/>
+              </a:ext>
+            </a:extLst>
+          </a:blip>
+          <a:stretch>
+            <a:fillRect/>
+          </a:stretch>
+        </p:blipFill>
+        <p:spPr>
+          <a:xfrm rot="831904">
+            <a:off x="119310" y="1911096"/>
+            <a:ext cx="914400" cy="914400"/>
+          </a:xfrm>
+          <a:prstGeom prst="rect">
+            <a:avLst/>
+          </a:prstGeom>
+        </p:spPr>
+      </p:pic>
+      <p:pic>
+        <p:nvPicPr>
+          <p:cNvPr id="8" name="Graphic 7" descr="Badge 3 with solid fill">
+            <a:extLst>
+              <a:ext uri="{FF2B5EF4-FFF2-40B4-BE49-F238E27FC236}">
+                <a16:creationId xmlns:a16="http://schemas.microsoft.com/office/drawing/2014/main" id="{BA47D6AC-ADBB-1AD0-093B-D2BDC7D9E525}"/>
+              </a:ext>
+            </a:extLst>
+          </p:cNvPr>
+          <p:cNvPicPr>
+            <a:picLocks noChangeAspect="1"/>
+          </p:cNvPicPr>
+          <p:nvPr/>
+        </p:nvPicPr>
+        <p:blipFill>
+          <a:blip r:embed="rId7">
+            <a:extLst>
+              <a:ext uri="{96DAC541-7B7A-43D3-8B79-37D633B846F1}">
+                <asvg:svgBlip xmlns:asvg="http://schemas.microsoft.com/office/drawing/2016/SVG/main" r:embed="rId8"/>
+              </a:ext>
+            </a:extLst>
+          </a:blip>
+          <a:stretch>
+            <a:fillRect/>
+          </a:stretch>
+        </p:blipFill>
+        <p:spPr>
+          <a:xfrm rot="20688846">
+            <a:off x="134822" y="2792529"/>
+            <a:ext cx="914400" cy="914400"/>
+          </a:xfrm>
+          <a:prstGeom prst="rect">
+            <a:avLst/>
+          </a:prstGeom>
+        </p:spPr>
+      </p:pic>
+      <p:pic>
+        <p:nvPicPr>
+          <p:cNvPr id="9" name="Graphic 8" descr="Badge 4 with solid fill">
+            <a:extLst>
+              <a:ext uri="{FF2B5EF4-FFF2-40B4-BE49-F238E27FC236}">
+                <a16:creationId xmlns:a16="http://schemas.microsoft.com/office/drawing/2014/main" id="{4C76BCD2-1682-5D0F-C942-C8D5A127D0FF}"/>
+              </a:ext>
+            </a:extLst>
+          </p:cNvPr>
+          <p:cNvPicPr>
+            <a:picLocks noChangeAspect="1"/>
+          </p:cNvPicPr>
+          <p:nvPr/>
+        </p:nvPicPr>
+        <p:blipFill>
+          <a:blip r:embed="rId9">
+            <a:extLst>
+              <a:ext uri="{96DAC541-7B7A-43D3-8B79-37D633B846F1}">
+                <asvg:svgBlip xmlns:asvg="http://schemas.microsoft.com/office/drawing/2016/SVG/main" r:embed="rId10"/>
+              </a:ext>
+            </a:extLst>
+          </a:blip>
+          <a:stretch>
+            <a:fillRect/>
+          </a:stretch>
+        </p:blipFill>
+        <p:spPr>
+          <a:xfrm rot="693099">
+            <a:off x="107775" y="3669601"/>
+            <a:ext cx="914400" cy="914400"/>
+          </a:xfrm>
+          <a:prstGeom prst="rect">
+            <a:avLst/>
+          </a:prstGeom>
+        </p:spPr>
+      </p:pic>
+      <p:pic>
+        <p:nvPicPr>
+          <p:cNvPr id="10" name="Graphic 9" descr="Badge 5 with solid fill">
+            <a:extLst>
+              <a:ext uri="{FF2B5EF4-FFF2-40B4-BE49-F238E27FC236}">
+                <a16:creationId xmlns:a16="http://schemas.microsoft.com/office/drawing/2014/main" id="{7E638CDB-9C2C-A552-9EFD-CAFB7670D358}"/>
+              </a:ext>
+            </a:extLst>
+          </p:cNvPr>
+          <p:cNvPicPr>
+            <a:picLocks noChangeAspect="1"/>
+          </p:cNvPicPr>
+          <p:nvPr/>
+        </p:nvPicPr>
+        <p:blipFill>
+          <a:blip r:embed="rId11">
+            <a:extLst>
+              <a:ext uri="{96DAC541-7B7A-43D3-8B79-37D633B846F1}">
+                <asvg:svgBlip xmlns:asvg="http://schemas.microsoft.com/office/drawing/2016/SVG/main" r:embed="rId12"/>
+              </a:ext>
+            </a:extLst>
+          </a:blip>
+          <a:stretch>
+            <a:fillRect/>
+          </a:stretch>
+        </p:blipFill>
+        <p:spPr>
+          <a:xfrm rot="20973659">
+            <a:off x="163350" y="4554426"/>
+            <a:ext cx="914400" cy="914400"/>
+          </a:xfrm>
+          <a:prstGeom prst="rect">
+            <a:avLst/>
+          </a:prstGeom>
+        </p:spPr>
+      </p:pic>
     </p:spTree>
     <p:extLst>
       <p:ext uri="{BB962C8B-B14F-4D97-AF65-F5344CB8AC3E}">
@@ -3764,6 +3944,186 @@
           </a:p>
         </p:txBody>
       </p:sp>
+      <p:pic>
+        <p:nvPicPr>
+          <p:cNvPr id="5" name="Graphic 4" descr="Badge 1 with solid fill">
+            <a:extLst>
+              <a:ext uri="{FF2B5EF4-FFF2-40B4-BE49-F238E27FC236}">
+                <a16:creationId xmlns:a16="http://schemas.microsoft.com/office/drawing/2014/main" id="{BF6FBFF2-036E-63B2-FF5F-C6C621EBD5E4}"/>
+              </a:ext>
+            </a:extLst>
+          </p:cNvPr>
+          <p:cNvPicPr>
+            <a:picLocks noChangeAspect="1"/>
+          </p:cNvPicPr>
+          <p:nvPr/>
+        </p:nvPicPr>
+        <p:blipFill>
+          <a:blip r:embed="rId2">
+            <a:extLst>
+              <a:ext uri="{96DAC541-7B7A-43D3-8B79-37D633B846F1}">
+                <asvg:svgBlip xmlns:asvg="http://schemas.microsoft.com/office/drawing/2016/SVG/main" r:embed="rId3"/>
+              </a:ext>
+            </a:extLst>
+          </a:blip>
+          <a:stretch>
+            <a:fillRect/>
+          </a:stretch>
+        </p:blipFill>
+        <p:spPr>
+          <a:xfrm>
+            <a:off x="260635" y="1690688"/>
+            <a:ext cx="914400" cy="914400"/>
+          </a:xfrm>
+          <a:prstGeom prst="rect">
+            <a:avLst/>
+          </a:prstGeom>
+        </p:spPr>
+      </p:pic>
+      <p:pic>
+        <p:nvPicPr>
+          <p:cNvPr id="7" name="Graphic 6" descr="Badge with solid fill">
+            <a:extLst>
+              <a:ext uri="{FF2B5EF4-FFF2-40B4-BE49-F238E27FC236}">
+                <a16:creationId xmlns:a16="http://schemas.microsoft.com/office/drawing/2014/main" id="{FBC07ED6-116A-52F3-A0BE-CC7F035034A0}"/>
+              </a:ext>
+            </a:extLst>
+          </p:cNvPr>
+          <p:cNvPicPr>
+            <a:picLocks noChangeAspect="1"/>
+          </p:cNvPicPr>
+          <p:nvPr/>
+        </p:nvPicPr>
+        <p:blipFill>
+          <a:blip r:embed="rId4">
+            <a:extLst>
+              <a:ext uri="{96DAC541-7B7A-43D3-8B79-37D633B846F1}">
+                <asvg:svgBlip xmlns:asvg="http://schemas.microsoft.com/office/drawing/2016/SVG/main" r:embed="rId5"/>
+              </a:ext>
+            </a:extLst>
+          </a:blip>
+          <a:stretch>
+            <a:fillRect/>
+          </a:stretch>
+        </p:blipFill>
+        <p:spPr>
+          <a:xfrm>
+            <a:off x="260635" y="2514600"/>
+            <a:ext cx="914400" cy="914400"/>
+          </a:xfrm>
+          <a:prstGeom prst="rect">
+            <a:avLst/>
+          </a:prstGeom>
+        </p:spPr>
+      </p:pic>
+      <p:pic>
+        <p:nvPicPr>
+          <p:cNvPr id="9" name="Graphic 8" descr="Badge 3 with solid fill">
+            <a:extLst>
+              <a:ext uri="{FF2B5EF4-FFF2-40B4-BE49-F238E27FC236}">
+                <a16:creationId xmlns:a16="http://schemas.microsoft.com/office/drawing/2014/main" id="{9D029ED3-AD96-9A2B-CD49-28B9B4956BD0}"/>
+              </a:ext>
+            </a:extLst>
+          </p:cNvPr>
+          <p:cNvPicPr>
+            <a:picLocks noChangeAspect="1"/>
+          </p:cNvPicPr>
+          <p:nvPr/>
+        </p:nvPicPr>
+        <p:blipFill>
+          <a:blip r:embed="rId6">
+            <a:extLst>
+              <a:ext uri="{96DAC541-7B7A-43D3-8B79-37D633B846F1}">
+                <asvg:svgBlip xmlns:asvg="http://schemas.microsoft.com/office/drawing/2016/SVG/main" r:embed="rId7"/>
+              </a:ext>
+            </a:extLst>
+          </a:blip>
+          <a:stretch>
+            <a:fillRect/>
+          </a:stretch>
+        </p:blipFill>
+        <p:spPr>
+          <a:xfrm>
+            <a:off x="260635" y="3338512"/>
+            <a:ext cx="914400" cy="914400"/>
+          </a:xfrm>
+          <a:prstGeom prst="rect">
+            <a:avLst/>
+          </a:prstGeom>
+        </p:spPr>
+      </p:pic>
+      <p:pic>
+        <p:nvPicPr>
+          <p:cNvPr id="11" name="Graphic 10" descr="Badge 4 with solid fill">
+            <a:extLst>
+              <a:ext uri="{FF2B5EF4-FFF2-40B4-BE49-F238E27FC236}">
+                <a16:creationId xmlns:a16="http://schemas.microsoft.com/office/drawing/2014/main" id="{DE410A6B-8834-6A4B-F139-B7A36C90B6E0}"/>
+              </a:ext>
+            </a:extLst>
+          </p:cNvPr>
+          <p:cNvPicPr>
+            <a:picLocks noChangeAspect="1"/>
+          </p:cNvPicPr>
+          <p:nvPr/>
+        </p:nvPicPr>
+        <p:blipFill>
+          <a:blip r:embed="rId8">
+            <a:extLst>
+              <a:ext uri="{96DAC541-7B7A-43D3-8B79-37D633B846F1}">
+                <asvg:svgBlip xmlns:asvg="http://schemas.microsoft.com/office/drawing/2016/SVG/main" r:embed="rId9"/>
+              </a:ext>
+            </a:extLst>
+          </a:blip>
+          <a:stretch>
+            <a:fillRect/>
+          </a:stretch>
+        </p:blipFill>
+        <p:spPr>
+          <a:xfrm>
+            <a:off x="260635" y="3861625"/>
+            <a:ext cx="914400" cy="914400"/>
+          </a:xfrm>
+          <a:prstGeom prst="rect">
+            <a:avLst/>
+          </a:prstGeom>
+        </p:spPr>
+      </p:pic>
+      <p:pic>
+        <p:nvPicPr>
+          <p:cNvPr id="13" name="Graphic 12" descr="Badge 5 with solid fill">
+            <a:extLst>
+              <a:ext uri="{FF2B5EF4-FFF2-40B4-BE49-F238E27FC236}">
+                <a16:creationId xmlns:a16="http://schemas.microsoft.com/office/drawing/2014/main" id="{DBABDF88-4A1C-9A7D-0477-F01F614F88D7}"/>
+              </a:ext>
+            </a:extLst>
+          </p:cNvPr>
+          <p:cNvPicPr>
+            <a:picLocks noChangeAspect="1"/>
+          </p:cNvPicPr>
+          <p:nvPr/>
+        </p:nvPicPr>
+        <p:blipFill>
+          <a:blip r:embed="rId10">
+            <a:extLst>
+              <a:ext uri="{96DAC541-7B7A-43D3-8B79-37D633B846F1}">
+                <asvg:svgBlip xmlns:asvg="http://schemas.microsoft.com/office/drawing/2016/SVG/main" r:embed="rId11"/>
+              </a:ext>
+            </a:extLst>
+          </a:blip>
+          <a:stretch>
+            <a:fillRect/>
+          </a:stretch>
+        </p:blipFill>
+        <p:spPr>
+          <a:xfrm>
+            <a:off x="260635" y="4387849"/>
+            <a:ext cx="914400" cy="914400"/>
+          </a:xfrm>
+          <a:prstGeom prst="rect">
+            <a:avLst/>
+          </a:prstGeom>
+        </p:spPr>
+      </p:pic>
     </p:spTree>
     <p:extLst>
       <p:ext uri="{BB962C8B-B14F-4D97-AF65-F5344CB8AC3E}">
@@ -4150,15 +4510,7 @@
           <a:p>
             <a:r>
               <a:rPr lang="en-US" dirty="0"/>
-              <a:t>My early “clean” data had some pretty weird results, including about 4 million extra votes </a:t>
-            </a:r>
-            <a:r>
-              <a:rPr lang="en-US"/>
-              <a:t>for “other</a:t>
-            </a:r>
-            <a:r>
-              <a:rPr lang="en-US" dirty="0"/>
-              <a:t>” candidates</a:t>
+              <a:t>My early “clean” data had some pretty weird results, including about 4 million extra votes for “other” candidates</a:t>
             </a:r>
           </a:p>
           <a:p>
@@ -4908,6 +5260,114 @@
           </a:prstGeom>
         </p:spPr>
       </p:pic>
+      <p:pic>
+        <p:nvPicPr>
+          <p:cNvPr id="11" name="Graphic 10" descr="Badge with solid fill">
+            <a:extLst>
+              <a:ext uri="{FF2B5EF4-FFF2-40B4-BE49-F238E27FC236}">
+                <a16:creationId xmlns:a16="http://schemas.microsoft.com/office/drawing/2014/main" id="{B49512C6-3246-C311-3CE8-52A7B9DD85FA}"/>
+              </a:ext>
+            </a:extLst>
+          </p:cNvPr>
+          <p:cNvPicPr>
+            <a:picLocks noChangeAspect="1"/>
+          </p:cNvPicPr>
+          <p:nvPr/>
+        </p:nvPicPr>
+        <p:blipFill>
+          <a:blip r:embed="rId3">
+            <a:extLst>
+              <a:ext uri="{96DAC541-7B7A-43D3-8B79-37D633B846F1}">
+                <asvg:svgBlip xmlns:asvg="http://schemas.microsoft.com/office/drawing/2016/SVG/main" r:embed="rId4"/>
+              </a:ext>
+            </a:extLst>
+          </a:blip>
+          <a:stretch>
+            <a:fillRect/>
+          </a:stretch>
+        </p:blipFill>
+        <p:spPr>
+          <a:xfrm rot="20594867">
+            <a:off x="10821956" y="950976"/>
+            <a:ext cx="914400" cy="914400"/>
+          </a:xfrm>
+          <a:prstGeom prst="rect">
+            <a:avLst/>
+          </a:prstGeom>
+        </p:spPr>
+      </p:pic>
+      <p:pic>
+        <p:nvPicPr>
+          <p:cNvPr id="12" name="Graphic 11" descr="Badge 3 with solid fill">
+            <a:extLst>
+              <a:ext uri="{FF2B5EF4-FFF2-40B4-BE49-F238E27FC236}">
+                <a16:creationId xmlns:a16="http://schemas.microsoft.com/office/drawing/2014/main" id="{3D0238A5-2615-47A1-E380-6DC718FAF391}"/>
+              </a:ext>
+            </a:extLst>
+          </p:cNvPr>
+          <p:cNvPicPr>
+            <a:picLocks noChangeAspect="1"/>
+          </p:cNvPicPr>
+          <p:nvPr/>
+        </p:nvPicPr>
+        <p:blipFill>
+          <a:blip r:embed="rId5">
+            <a:extLst>
+              <a:ext uri="{96DAC541-7B7A-43D3-8B79-37D633B846F1}">
+                <asvg:svgBlip xmlns:asvg="http://schemas.microsoft.com/office/drawing/2016/SVG/main" r:embed="rId6"/>
+              </a:ext>
+            </a:extLst>
+          </a:blip>
+          <a:stretch>
+            <a:fillRect/>
+          </a:stretch>
+        </p:blipFill>
+        <p:spPr>
+          <a:xfrm rot="901544">
+            <a:off x="10839211" y="1803262"/>
+            <a:ext cx="914400" cy="914400"/>
+          </a:xfrm>
+          <a:prstGeom prst="rect">
+            <a:avLst/>
+          </a:prstGeom>
+        </p:spPr>
+      </p:pic>
+      <p:pic>
+        <p:nvPicPr>
+          <p:cNvPr id="13" name="Graphic 12" descr="Badge 4 with solid fill">
+            <a:extLst>
+              <a:ext uri="{FF2B5EF4-FFF2-40B4-BE49-F238E27FC236}">
+                <a16:creationId xmlns:a16="http://schemas.microsoft.com/office/drawing/2014/main" id="{7DE9E6B7-505A-46C6-E624-CCF2030BCC10}"/>
+              </a:ext>
+            </a:extLst>
+          </p:cNvPr>
+          <p:cNvPicPr>
+            <a:picLocks noChangeAspect="1"/>
+          </p:cNvPicPr>
+          <p:nvPr/>
+        </p:nvPicPr>
+        <p:blipFill>
+          <a:blip r:embed="rId7">
+            <a:extLst>
+              <a:ext uri="{96DAC541-7B7A-43D3-8B79-37D633B846F1}">
+                <asvg:svgBlip xmlns:asvg="http://schemas.microsoft.com/office/drawing/2016/SVG/main" r:embed="rId8"/>
+              </a:ext>
+            </a:extLst>
+          </a:blip>
+          <a:stretch>
+            <a:fillRect/>
+          </a:stretch>
+        </p:blipFill>
+        <p:spPr>
+          <a:xfrm rot="20877016">
+            <a:off x="10794952" y="2637824"/>
+            <a:ext cx="914400" cy="914400"/>
+          </a:xfrm>
+          <a:prstGeom prst="rect">
+            <a:avLst/>
+          </a:prstGeom>
+        </p:spPr>
+      </p:pic>
     </p:spTree>
     <p:extLst>
       <p:ext uri="{BB962C8B-B14F-4D97-AF65-F5344CB8AC3E}">
@@ -5035,6 +5495,78 @@
           <a:xfrm>
             <a:off x="6096000" y="1234435"/>
             <a:ext cx="5852172" cy="4389129"/>
+          </a:xfrm>
+          <a:prstGeom prst="rect">
+            <a:avLst/>
+          </a:prstGeom>
+        </p:spPr>
+      </p:pic>
+      <p:pic>
+        <p:nvPicPr>
+          <p:cNvPr id="12" name="Graphic 11" descr="Badge 1 with solid fill">
+            <a:extLst>
+              <a:ext uri="{FF2B5EF4-FFF2-40B4-BE49-F238E27FC236}">
+                <a16:creationId xmlns:a16="http://schemas.microsoft.com/office/drawing/2014/main" id="{664E8572-4628-8ED9-3105-3B6AD5CA87AD}"/>
+              </a:ext>
+            </a:extLst>
+          </p:cNvPr>
+          <p:cNvPicPr>
+            <a:picLocks noChangeAspect="1"/>
+          </p:cNvPicPr>
+          <p:nvPr/>
+        </p:nvPicPr>
+        <p:blipFill>
+          <a:blip r:embed="rId3">
+            <a:extLst>
+              <a:ext uri="{96DAC541-7B7A-43D3-8B79-37D633B846F1}">
+                <asvg:svgBlip xmlns:asvg="http://schemas.microsoft.com/office/drawing/2016/SVG/main" r:embed="rId4"/>
+              </a:ext>
+            </a:extLst>
+          </a:blip>
+          <a:stretch>
+            <a:fillRect/>
+          </a:stretch>
+        </p:blipFill>
+        <p:spPr>
+          <a:xfrm rot="20837719">
+            <a:off x="7196176" y="5712921"/>
+            <a:ext cx="914400" cy="914400"/>
+          </a:xfrm>
+          <a:prstGeom prst="rect">
+            <a:avLst/>
+          </a:prstGeom>
+        </p:spPr>
+      </p:pic>
+      <p:pic>
+        <p:nvPicPr>
+          <p:cNvPr id="13" name="Graphic 12" descr="Badge 4 with solid fill">
+            <a:extLst>
+              <a:ext uri="{FF2B5EF4-FFF2-40B4-BE49-F238E27FC236}">
+                <a16:creationId xmlns:a16="http://schemas.microsoft.com/office/drawing/2014/main" id="{91CCF1BD-1FD6-17BE-C2A0-6901FD0BEFA9}"/>
+              </a:ext>
+            </a:extLst>
+          </p:cNvPr>
+          <p:cNvPicPr>
+            <a:picLocks noChangeAspect="1"/>
+          </p:cNvPicPr>
+          <p:nvPr/>
+        </p:nvPicPr>
+        <p:blipFill>
+          <a:blip r:embed="rId5">
+            <a:extLst>
+              <a:ext uri="{96DAC541-7B7A-43D3-8B79-37D633B846F1}">
+                <asvg:svgBlip xmlns:asvg="http://schemas.microsoft.com/office/drawing/2016/SVG/main" r:embed="rId6"/>
+              </a:ext>
+            </a:extLst>
+          </a:blip>
+          <a:stretch>
+            <a:fillRect/>
+          </a:stretch>
+        </p:blipFill>
+        <p:spPr>
+          <a:xfrm rot="553650">
+            <a:off x="8107686" y="5719763"/>
+            <a:ext cx="914400" cy="914400"/>
           </a:xfrm>
           <a:prstGeom prst="rect">
             <a:avLst/>
@@ -5157,6 +5689,150 @@
           <a:xfrm>
             <a:off x="609589" y="1258088"/>
             <a:ext cx="10972822" cy="5486411"/>
+          </a:xfrm>
+          <a:prstGeom prst="rect">
+            <a:avLst/>
+          </a:prstGeom>
+        </p:spPr>
+      </p:pic>
+      <p:pic>
+        <p:nvPicPr>
+          <p:cNvPr id="6" name="Graphic 5" descr="Badge 1 with solid fill">
+            <a:extLst>
+              <a:ext uri="{FF2B5EF4-FFF2-40B4-BE49-F238E27FC236}">
+                <a16:creationId xmlns:a16="http://schemas.microsoft.com/office/drawing/2014/main" id="{8D733000-C277-8BC2-9374-114C99D0D98A}"/>
+              </a:ext>
+            </a:extLst>
+          </p:cNvPr>
+          <p:cNvPicPr>
+            <a:picLocks noChangeAspect="1"/>
+          </p:cNvPicPr>
+          <p:nvPr/>
+        </p:nvPicPr>
+        <p:blipFill>
+          <a:blip r:embed="rId3">
+            <a:extLst>
+              <a:ext uri="{96DAC541-7B7A-43D3-8B79-37D633B846F1}">
+                <asvg:svgBlip xmlns:asvg="http://schemas.microsoft.com/office/drawing/2016/SVG/main" r:embed="rId4"/>
+              </a:ext>
+            </a:extLst>
+          </a:blip>
+          <a:stretch>
+            <a:fillRect/>
+          </a:stretch>
+        </p:blipFill>
+        <p:spPr>
+          <a:xfrm rot="855638">
+            <a:off x="10798087" y="921944"/>
+            <a:ext cx="914400" cy="914400"/>
+          </a:xfrm>
+          <a:prstGeom prst="rect">
+            <a:avLst/>
+          </a:prstGeom>
+        </p:spPr>
+      </p:pic>
+      <p:pic>
+        <p:nvPicPr>
+          <p:cNvPr id="7" name="Graphic 6" descr="Badge with solid fill">
+            <a:extLst>
+              <a:ext uri="{FF2B5EF4-FFF2-40B4-BE49-F238E27FC236}">
+                <a16:creationId xmlns:a16="http://schemas.microsoft.com/office/drawing/2014/main" id="{A6258E78-5F5F-6266-846C-8C259E0F0A5D}"/>
+              </a:ext>
+            </a:extLst>
+          </p:cNvPr>
+          <p:cNvPicPr>
+            <a:picLocks noChangeAspect="1"/>
+          </p:cNvPicPr>
+          <p:nvPr/>
+        </p:nvPicPr>
+        <p:blipFill>
+          <a:blip r:embed="rId5">
+            <a:extLst>
+              <a:ext uri="{96DAC541-7B7A-43D3-8B79-37D633B846F1}">
+                <asvg:svgBlip xmlns:asvg="http://schemas.microsoft.com/office/drawing/2016/SVG/main" r:embed="rId6"/>
+              </a:ext>
+            </a:extLst>
+          </a:blip>
+          <a:stretch>
+            <a:fillRect/>
+          </a:stretch>
+        </p:blipFill>
+        <p:spPr>
+          <a:xfrm rot="20889460">
+            <a:off x="10583916" y="1909720"/>
+            <a:ext cx="914400" cy="914400"/>
+          </a:xfrm>
+          <a:prstGeom prst="rect">
+            <a:avLst/>
+          </a:prstGeom>
+        </p:spPr>
+      </p:pic>
+      <p:pic>
+        <p:nvPicPr>
+          <p:cNvPr id="8" name="Graphic 7" descr="Badge 3 with solid fill">
+            <a:extLst>
+              <a:ext uri="{FF2B5EF4-FFF2-40B4-BE49-F238E27FC236}">
+                <a16:creationId xmlns:a16="http://schemas.microsoft.com/office/drawing/2014/main" id="{D169333E-03E5-58BE-4103-1620948E2371}"/>
+              </a:ext>
+            </a:extLst>
+          </p:cNvPr>
+          <p:cNvPicPr>
+            <a:picLocks noChangeAspect="1"/>
+          </p:cNvPicPr>
+          <p:nvPr/>
+        </p:nvPicPr>
+        <p:blipFill>
+          <a:blip r:embed="rId7">
+            <a:extLst>
+              <a:ext uri="{96DAC541-7B7A-43D3-8B79-37D633B846F1}">
+                <asvg:svgBlip xmlns:asvg="http://schemas.microsoft.com/office/drawing/2016/SVG/main" r:embed="rId8"/>
+              </a:ext>
+            </a:extLst>
+          </a:blip>
+          <a:stretch>
+            <a:fillRect/>
+          </a:stretch>
+        </p:blipFill>
+        <p:spPr>
+          <a:xfrm rot="705958">
+            <a:off x="11065334" y="2667274"/>
+            <a:ext cx="914400" cy="914400"/>
+          </a:xfrm>
+          <a:prstGeom prst="rect">
+            <a:avLst/>
+          </a:prstGeom>
+        </p:spPr>
+      </p:pic>
+      <p:pic>
+        <p:nvPicPr>
+          <p:cNvPr id="9" name="Graphic 8" descr="Badge 4 with solid fill">
+            <a:extLst>
+              <a:ext uri="{FF2B5EF4-FFF2-40B4-BE49-F238E27FC236}">
+                <a16:creationId xmlns:a16="http://schemas.microsoft.com/office/drawing/2014/main" id="{B9E583D3-C6DF-6938-1553-C6FF154CF25D}"/>
+              </a:ext>
+            </a:extLst>
+          </p:cNvPr>
+          <p:cNvPicPr>
+            <a:picLocks noChangeAspect="1"/>
+          </p:cNvPicPr>
+          <p:nvPr/>
+        </p:nvPicPr>
+        <p:blipFill>
+          <a:blip r:embed="rId9">
+            <a:extLst>
+              <a:ext uri="{96DAC541-7B7A-43D3-8B79-37D633B846F1}">
+                <asvg:svgBlip xmlns:asvg="http://schemas.microsoft.com/office/drawing/2016/SVG/main" r:embed="rId10"/>
+              </a:ext>
+            </a:extLst>
+          </a:blip>
+          <a:stretch>
+            <a:fillRect/>
+          </a:stretch>
+        </p:blipFill>
+        <p:spPr>
+          <a:xfrm rot="20754633">
+            <a:off x="10597364" y="3654532"/>
+            <a:ext cx="914400" cy="914400"/>
           </a:xfrm>
           <a:prstGeom prst="rect">
             <a:avLst/>
@@ -5309,6 +5985,42 @@
           </a:p>
         </p:txBody>
       </p:sp>
+      <p:pic>
+        <p:nvPicPr>
+          <p:cNvPr id="8" name="Graphic 7" descr="Badge with solid fill">
+            <a:extLst>
+              <a:ext uri="{FF2B5EF4-FFF2-40B4-BE49-F238E27FC236}">
+                <a16:creationId xmlns:a16="http://schemas.microsoft.com/office/drawing/2014/main" id="{39F2F9FF-0D38-B684-8A38-AB780A3998E5}"/>
+              </a:ext>
+            </a:extLst>
+          </p:cNvPr>
+          <p:cNvPicPr>
+            <a:picLocks noChangeAspect="1"/>
+          </p:cNvPicPr>
+          <p:nvPr/>
+        </p:nvPicPr>
+        <p:blipFill>
+          <a:blip r:embed="rId3">
+            <a:extLst>
+              <a:ext uri="{96DAC541-7B7A-43D3-8B79-37D633B846F1}">
+                <asvg:svgBlip xmlns:asvg="http://schemas.microsoft.com/office/drawing/2016/SVG/main" r:embed="rId4"/>
+              </a:ext>
+            </a:extLst>
+          </a:blip>
+          <a:stretch>
+            <a:fillRect/>
+          </a:stretch>
+        </p:blipFill>
+        <p:spPr>
+          <a:xfrm rot="790597">
+            <a:off x="11334018" y="1368425"/>
+            <a:ext cx="914400" cy="914400"/>
+          </a:xfrm>
+          <a:prstGeom prst="rect">
+            <a:avLst/>
+          </a:prstGeom>
+        </p:spPr>
+      </p:pic>
     </p:spTree>
     <p:extLst>
       <p:ext uri="{BB962C8B-B14F-4D97-AF65-F5344CB8AC3E}">

</xml_diff>

<commit_message>
Minor adjustments to report
</commit_message>
<xml_diff>
--- a/report.pptx
+++ b/report.pptx
@@ -3589,6 +3589,36 @@
           <a:chExt cx="0" cy="0"/>
         </a:xfrm>
       </p:grpSpPr>
+      <p:pic>
+        <p:nvPicPr>
+          <p:cNvPr id="14" name="Picture 13">
+            <a:extLst>
+              <a:ext uri="{FF2B5EF4-FFF2-40B4-BE49-F238E27FC236}">
+                <a16:creationId xmlns:a16="http://schemas.microsoft.com/office/drawing/2014/main" id="{78952F40-9146-FB15-103C-0CA6B61F077A}"/>
+              </a:ext>
+            </a:extLst>
+          </p:cNvPr>
+          <p:cNvPicPr>
+            <a:picLocks noChangeAspect="1"/>
+          </p:cNvPicPr>
+          <p:nvPr/>
+        </p:nvPicPr>
+        <p:blipFill>
+          <a:blip r:embed="rId2"/>
+          <a:stretch>
+            <a:fillRect/>
+          </a:stretch>
+        </p:blipFill>
+        <p:spPr>
+          <a:xfrm>
+            <a:off x="1112423" y="102295"/>
+            <a:ext cx="10515601" cy="6653410"/>
+          </a:xfrm>
+          <a:prstGeom prst="rect">
+            <a:avLst/>
+          </a:prstGeom>
+        </p:spPr>
+      </p:pic>
       <p:sp>
         <p:nvSpPr>
           <p:cNvPr id="2" name="Title 1">
@@ -3617,40 +3647,6 @@
           </a:p>
         </p:txBody>
       </p:sp>
-      <p:pic>
-        <p:nvPicPr>
-          <p:cNvPr id="5" name="Content Placeholder 4" descr="A group of white squares with black and red squares&#10;&#10;Description automatically generated">
-            <a:extLst>
-              <a:ext uri="{FF2B5EF4-FFF2-40B4-BE49-F238E27FC236}">
-                <a16:creationId xmlns:a16="http://schemas.microsoft.com/office/drawing/2014/main" id="{019918E3-9EAC-4E9D-5A9C-47BC7206D13B}"/>
-              </a:ext>
-            </a:extLst>
-          </p:cNvPr>
-          <p:cNvPicPr>
-            <a:picLocks noGrp="1" noChangeAspect="1"/>
-          </p:cNvPicPr>
-          <p:nvPr>
-            <p:ph idx="1"/>
-          </p:nvPr>
-        </p:nvPicPr>
-        <p:blipFill rotWithShape="1">
-          <a:blip r:embed="rId2">
-            <a:extLst>
-              <a:ext uri="{28A0092B-C50C-407E-A947-70E740481C1C}">
-                <a14:useLocalDpi xmlns:a14="http://schemas.microsoft.com/office/drawing/2010/main" val="0"/>
-              </a:ext>
-            </a:extLst>
-          </a:blip>
-          <a:srcRect l="6347" t="6256" r="5919" b="4404"/>
-          <a:stretch/>
-        </p:blipFill>
-        <p:spPr>
-          <a:xfrm>
-            <a:off x="1043473" y="0"/>
-            <a:ext cx="10105053" cy="6860019"/>
-          </a:xfrm>
-        </p:spPr>
-      </p:pic>
       <p:pic>
         <p:nvPicPr>
           <p:cNvPr id="6" name="Graphic 5" descr="Badge 1 with solid fill">
@@ -4503,9 +4499,16 @@
             <p:ph idx="1"/>
           </p:nvPr>
         </p:nvSpPr>
-        <p:spPr/>
-        <p:txBody>
-          <a:bodyPr/>
+        <p:spPr>
+          <a:xfrm>
+            <a:off x="838200" y="1825626"/>
+            <a:ext cx="10515600" cy="2291080"/>
+          </a:xfrm>
+        </p:spPr>
+        <p:txBody>
+          <a:bodyPr>
+            <a:normAutofit lnSpcReduction="10000"/>
+          </a:bodyPr>
           <a:lstStyle/>
           <a:p>
             <a:r>
@@ -4516,7 +4519,7 @@
           <a:p>
             <a:r>
               <a:rPr lang="en-US" dirty="0"/>
-              <a:t>I compared my clean data to the official counts from the FEC. I’m within 0.8% for the national numbers, which feels just barely adequate.</a:t>
+              <a:t>I compared my final clean data to the official counts from the FEC. I’m within 0.8% for the national numbers, which feels barely adequate. I’d like to improve this, especially the extra “other” votes.</a:t>
             </a:r>
           </a:p>
           <a:p>
@@ -4539,7 +4542,7 @@
           <p:nvPr>
             <p:extLst>
               <p:ext uri="{D42A27DB-BD31-4B8C-83A1-F6EECF244321}">
-                <p14:modId xmlns:p14="http://schemas.microsoft.com/office/powerpoint/2010/main" val="1487743757"/>
+                <p14:modId xmlns:p14="http://schemas.microsoft.com/office/powerpoint/2010/main" val="1232858766"/>
               </p:ext>
             </p:extLst>
           </p:nvPr>
@@ -5018,12 +5021,15 @@
             </a:r>
           </a:p>
           <a:p>
-            <a:endParaRPr lang="en-US" dirty="0"/>
-          </a:p>
-          <a:p>
             <a:r>
               <a:rPr lang="en-US" dirty="0"/>
-              <a:t>I was interested to see that BOTH major candidates got a higher percentage of votes in 2020 than they did in 2016. They got votes from the “other” candidates – and the Democrats got more.</a:t>
+              <a:t>And I did not consider Electoral College counts.</a:t>
+            </a:r>
+          </a:p>
+          <a:p>
+            <a:r>
+              <a:rPr lang="en-US" dirty="0"/>
+              <a:t>I was interested to see that BOTH major candidates got a higher percentage of votes in 2020 than they did in 2016.</a:t>
             </a:r>
           </a:p>
         </p:txBody>
@@ -5324,7 +5330,7 @@
         </p:blipFill>
         <p:spPr>
           <a:xfrm rot="901544">
-            <a:off x="10839211" y="1803262"/>
+            <a:off x="11165633" y="1433929"/>
             <a:ext cx="914400" cy="914400"/>
           </a:xfrm>
           <a:prstGeom prst="rect">
@@ -5360,7 +5366,7 @@
         </p:blipFill>
         <p:spPr>
           <a:xfrm rot="20877016">
-            <a:off x="10794952" y="2637824"/>
+            <a:off x="10666469" y="1910997"/>
             <a:ext cx="914400" cy="914400"/>
           </a:xfrm>
           <a:prstGeom prst="rect">
@@ -5529,7 +5535,7 @@
         </p:blipFill>
         <p:spPr>
           <a:xfrm rot="20837719">
-            <a:off x="7196176" y="5712921"/>
+            <a:off x="9111441" y="514108"/>
             <a:ext cx="914400" cy="914400"/>
           </a:xfrm>
           <a:prstGeom prst="rect">
@@ -5565,7 +5571,7 @@
         </p:blipFill>
         <p:spPr>
           <a:xfrm rot="553650">
-            <a:off x="8107686" y="5719763"/>
+            <a:off x="9752701" y="603534"/>
             <a:ext cx="914400" cy="914400"/>
           </a:xfrm>
           <a:prstGeom prst="rect">
@@ -5603,75 +5609,21 @@
           <a:chExt cx="0" cy="0"/>
         </a:xfrm>
       </p:grpSpPr>
-      <p:sp>
-        <p:nvSpPr>
-          <p:cNvPr id="2" name="Title 1">
-            <a:extLst>
-              <a:ext uri="{FF2B5EF4-FFF2-40B4-BE49-F238E27FC236}">
-                <a16:creationId xmlns:a16="http://schemas.microsoft.com/office/drawing/2014/main" id="{B3E8F7E0-E05A-D22A-6764-B458FF87474F}"/>
-              </a:ext>
-            </a:extLst>
-          </p:cNvPr>
-          <p:cNvSpPr>
-            <a:spLocks noGrp="1"/>
-          </p:cNvSpPr>
-          <p:nvPr>
-            <p:ph type="title"/>
-          </p:nvPr>
-        </p:nvSpPr>
-        <p:spPr/>
-        <p:txBody>
-          <a:bodyPr/>
-          <a:lstStyle/>
-          <a:p>
-            <a:r>
-              <a:rPr lang="en-US" dirty="0"/>
-              <a:t>…and Where Did They Go?</a:t>
-            </a:r>
-          </a:p>
-        </p:txBody>
-      </p:sp>
-      <p:sp>
-        <p:nvSpPr>
-          <p:cNvPr id="3" name="Content Placeholder 2">
-            <a:extLst>
-              <a:ext uri="{FF2B5EF4-FFF2-40B4-BE49-F238E27FC236}">
-                <a16:creationId xmlns:a16="http://schemas.microsoft.com/office/drawing/2014/main" id="{DC24DD1E-B7C9-A590-D713-27E7D535874E}"/>
-              </a:ext>
-            </a:extLst>
-          </p:cNvPr>
-          <p:cNvSpPr>
-            <a:spLocks noGrp="1"/>
-          </p:cNvSpPr>
-          <p:nvPr>
-            <p:ph idx="1"/>
-          </p:nvPr>
-        </p:nvSpPr>
-        <p:spPr/>
-        <p:txBody>
-          <a:bodyPr/>
-          <a:lstStyle/>
-          <a:p>
-            <a:pPr marL="0" indent="0">
-              <a:buNone/>
-            </a:pPr>
-            <a:endParaRPr lang="en-US" dirty="0"/>
-          </a:p>
-        </p:txBody>
-      </p:sp>
       <p:pic>
         <p:nvPicPr>
-          <p:cNvPr id="5" name="Picture 4" descr="A graph of a graph with a number of different colored squares&#10;&#10;Description automatically generated with medium confidence">
-            <a:extLst>
-              <a:ext uri="{FF2B5EF4-FFF2-40B4-BE49-F238E27FC236}">
-                <a16:creationId xmlns:a16="http://schemas.microsoft.com/office/drawing/2014/main" id="{7C8E6050-0961-13C1-2F8C-BC49210212C1}"/>
+          <p:cNvPr id="11" name="Content Placeholder 10" descr="A graph of a graph with a number of different colored squares&#10;&#10;Description automatically generated with medium confidence">
+            <a:extLst>
+              <a:ext uri="{FF2B5EF4-FFF2-40B4-BE49-F238E27FC236}">
+                <a16:creationId xmlns:a16="http://schemas.microsoft.com/office/drawing/2014/main" id="{D23F6FFE-03DA-F017-B615-3C6A6B7C7154}"/>
               </a:ext>
             </a:extLst>
           </p:cNvPr>
           <p:cNvPicPr>
-            <a:picLocks noChangeAspect="1"/>
+            <a:picLocks noGrp="1" noChangeAspect="1"/>
           </p:cNvPicPr>
-          <p:nvPr/>
+          <p:nvPr>
+            <p:ph idx="1"/>
+          </p:nvPr>
         </p:nvPicPr>
         <p:blipFill>
           <a:blip r:embed="rId2">
@@ -5687,14 +5639,39 @@
         </p:blipFill>
         <p:spPr>
           <a:xfrm>
-            <a:off x="609589" y="1258088"/>
-            <a:ext cx="10972822" cy="5486411"/>
+            <a:off x="379042" y="954036"/>
+            <a:ext cx="11430000" cy="5715001"/>
           </a:xfrm>
-          <a:prstGeom prst="rect">
-            <a:avLst/>
-          </a:prstGeom>
         </p:spPr>
       </p:pic>
+      <p:sp>
+        <p:nvSpPr>
+          <p:cNvPr id="2" name="Title 1">
+            <a:extLst>
+              <a:ext uri="{FF2B5EF4-FFF2-40B4-BE49-F238E27FC236}">
+                <a16:creationId xmlns:a16="http://schemas.microsoft.com/office/drawing/2014/main" id="{B3E8F7E0-E05A-D22A-6764-B458FF87474F}"/>
+              </a:ext>
+            </a:extLst>
+          </p:cNvPr>
+          <p:cNvSpPr>
+            <a:spLocks noGrp="1"/>
+          </p:cNvSpPr>
+          <p:nvPr>
+            <p:ph type="title"/>
+          </p:nvPr>
+        </p:nvSpPr>
+        <p:spPr/>
+        <p:txBody>
+          <a:bodyPr/>
+          <a:lstStyle/>
+          <a:p>
+            <a:r>
+              <a:rPr lang="en-US" dirty="0"/>
+              <a:t>…and Where Did They Go?</a:t>
+            </a:r>
+          </a:p>
+        </p:txBody>
+      </p:sp>
       <p:pic>
         <p:nvPicPr>
           <p:cNvPr id="6" name="Graphic 5" descr="Badge 1 with solid fill">
@@ -5759,7 +5736,7 @@
         </p:blipFill>
         <p:spPr>
           <a:xfrm rot="20889460">
-            <a:off x="10583916" y="1909720"/>
+            <a:off x="10597363" y="1463240"/>
             <a:ext cx="914400" cy="914400"/>
           </a:xfrm>
           <a:prstGeom prst="rect">
@@ -5795,7 +5772,7 @@
         </p:blipFill>
         <p:spPr>
           <a:xfrm rot="705958">
-            <a:off x="11065334" y="2667274"/>
+            <a:off x="11082884" y="1935962"/>
             <a:ext cx="914400" cy="914400"/>
           </a:xfrm>
           <a:prstGeom prst="rect">
@@ -5831,7 +5808,7 @@
         </p:blipFill>
         <p:spPr>
           <a:xfrm rot="20754633">
-            <a:off x="10597364" y="3654532"/>
+            <a:off x="10797096" y="2417055"/>
             <a:ext cx="914400" cy="914400"/>
           </a:xfrm>
           <a:prstGeom prst="rect">

</xml_diff>